<commit_message>
added agile coaching competency framework
</commit_message>
<xml_diff>
--- a/coaching-models.pptx
+++ b/coaching-models.pptx
@@ -5,7 +5,7 @@
     <p:sldMasterId id="2147483660" r:id="rId1"/>
   </p:sldMasterIdLst>
   <p:notesMasterIdLst>
-    <p:notesMasterId r:id="rId13"/>
+    <p:notesMasterId r:id="rId14"/>
   </p:notesMasterIdLst>
   <p:sldIdLst>
     <p:sldId id="256" r:id="rId2"/>
@@ -18,7 +18,8 @@
     <p:sldId id="264" r:id="rId9"/>
     <p:sldId id="266" r:id="rId10"/>
     <p:sldId id="267" r:id="rId11"/>
-    <p:sldId id="265" r:id="rId12"/>
+    <p:sldId id="268" r:id="rId12"/>
+    <p:sldId id="265" r:id="rId13"/>
   </p:sldIdLst>
   <p:sldSz cx="13716000" cy="8229600"/>
   <p:notesSz cx="6858000" cy="9144000"/>
@@ -135,170 +136,6 @@
 
 <file path=ppt/changesInfos/changesInfo1.xml><?xml version="1.0" encoding="utf-8"?>
 <pc:chgInfo xmlns:a="http://schemas.openxmlformats.org/drawingml/2006/main" xmlns:r="http://schemas.openxmlformats.org/officeDocument/2006/relationships" xmlns:ac="http://schemas.microsoft.com/office/drawing/2013/main/command" xmlns:pc="http://schemas.microsoft.com/office/powerpoint/2013/main/command">
-  <pc:docChgLst>
-    <pc:chgData name="Mac Ward" userId="8a6b6e81487c01eb" providerId="LiveId" clId="{E57B7486-BE84-4F44-90FF-66CDF96DF404}"/>
-    <pc:docChg chg="addSld modSld">
-      <pc:chgData name="Mac Ward" userId="8a6b6e81487c01eb" providerId="LiveId" clId="{E57B7486-BE84-4F44-90FF-66CDF96DF404}" dt="2019-04-17T22:20:48.061" v="201" actId="20577"/>
-      <pc:docMkLst>
-        <pc:docMk/>
-      </pc:docMkLst>
-      <pc:sldChg chg="modSp">
-        <pc:chgData name="Mac Ward" userId="8a6b6e81487c01eb" providerId="LiveId" clId="{E57B7486-BE84-4F44-90FF-66CDF96DF404}" dt="2019-04-17T22:20:48.061" v="201" actId="20577"/>
-        <pc:sldMkLst>
-          <pc:docMk/>
-          <pc:sldMk cId="2578171886" sldId="256"/>
-        </pc:sldMkLst>
-        <pc:spChg chg="mod">
-          <ac:chgData name="Mac Ward" userId="8a6b6e81487c01eb" providerId="LiveId" clId="{E57B7486-BE84-4F44-90FF-66CDF96DF404}" dt="2019-04-17T22:07:09.784" v="22" actId="20577"/>
-          <ac:spMkLst>
-            <pc:docMk/>
-            <pc:sldMk cId="2578171886" sldId="256"/>
-            <ac:spMk id="2" creationId="{5CADFF1F-4ABE-4400-9EFA-F76ADA081DE5}"/>
-          </ac:spMkLst>
-        </pc:spChg>
-        <pc:spChg chg="mod">
-          <ac:chgData name="Mac Ward" userId="8a6b6e81487c01eb" providerId="LiveId" clId="{E57B7486-BE84-4F44-90FF-66CDF96DF404}" dt="2019-04-17T22:20:48.061" v="201" actId="20577"/>
-          <ac:spMkLst>
-            <pc:docMk/>
-            <pc:sldMk cId="2578171886" sldId="256"/>
-            <ac:spMk id="3" creationId="{096392BD-E6C3-4C07-8920-6E228B0E6CEC}"/>
-          </ac:spMkLst>
-        </pc:spChg>
-      </pc:sldChg>
-      <pc:sldChg chg="modSp">
-        <pc:chgData name="Mac Ward" userId="8a6b6e81487c01eb" providerId="LiveId" clId="{E57B7486-BE84-4F44-90FF-66CDF96DF404}" dt="2019-04-17T22:11:28.378" v="37" actId="404"/>
-        <pc:sldMkLst>
-          <pc:docMk/>
-          <pc:sldMk cId="3720381224" sldId="257"/>
-        </pc:sldMkLst>
-        <pc:spChg chg="mod">
-          <ac:chgData name="Mac Ward" userId="8a6b6e81487c01eb" providerId="LiveId" clId="{E57B7486-BE84-4F44-90FF-66CDF96DF404}" dt="2019-04-17T22:11:28.378" v="37" actId="404"/>
-          <ac:spMkLst>
-            <pc:docMk/>
-            <pc:sldMk cId="3720381224" sldId="257"/>
-            <ac:spMk id="3" creationId="{D5F7A71E-A240-41CB-A901-B6A673C61435}"/>
-          </ac:spMkLst>
-        </pc:spChg>
-        <pc:picChg chg="mod">
-          <ac:chgData name="Mac Ward" userId="8a6b6e81487c01eb" providerId="LiveId" clId="{E57B7486-BE84-4F44-90FF-66CDF96DF404}" dt="2019-04-17T22:08:18.989" v="25" actId="14100"/>
-          <ac:picMkLst>
-            <pc:docMk/>
-            <pc:sldMk cId="3720381224" sldId="257"/>
-            <ac:picMk id="2" creationId="{E3B7C121-9268-4C66-9922-A7D5D319B9BC}"/>
-          </ac:picMkLst>
-        </pc:picChg>
-      </pc:sldChg>
-      <pc:sldChg chg="addSp modSp add">
-        <pc:chgData name="Mac Ward" userId="8a6b6e81487c01eb" providerId="LiveId" clId="{E57B7486-BE84-4F44-90FF-66CDF96DF404}" dt="2019-04-17T22:16:55.980" v="92" actId="2711"/>
-        <pc:sldMkLst>
-          <pc:docMk/>
-          <pc:sldMk cId="2349023615" sldId="258"/>
-        </pc:sldMkLst>
-        <pc:spChg chg="add mod">
-          <ac:chgData name="Mac Ward" userId="8a6b6e81487c01eb" providerId="LiveId" clId="{E57B7486-BE84-4F44-90FF-66CDF96DF404}" dt="2019-04-17T22:11:18.716" v="33" actId="1076"/>
-          <ac:spMkLst>
-            <pc:docMk/>
-            <pc:sldMk cId="2349023615" sldId="258"/>
-            <ac:spMk id="2" creationId="{67608B0C-720E-4935-B472-CBEDD321DFAA}"/>
-          </ac:spMkLst>
-        </pc:spChg>
-        <pc:spChg chg="add mod">
-          <ac:chgData name="Mac Ward" userId="8a6b6e81487c01eb" providerId="LiveId" clId="{E57B7486-BE84-4F44-90FF-66CDF96DF404}" dt="2019-04-17T22:16:55.980" v="92" actId="2711"/>
-          <ac:spMkLst>
-            <pc:docMk/>
-            <pc:sldMk cId="2349023615" sldId="258"/>
-            <ac:spMk id="3" creationId="{CB3CCAAD-6E69-45C7-8D0E-169C8DEDEBC6}"/>
-          </ac:spMkLst>
-        </pc:spChg>
-        <pc:picChg chg="add">
-          <ac:chgData name="Mac Ward" userId="8a6b6e81487c01eb" providerId="LiveId" clId="{E57B7486-BE84-4F44-90FF-66CDF96DF404}" dt="2019-04-17T22:10:52.489" v="27"/>
-          <ac:picMkLst>
-            <pc:docMk/>
-            <pc:sldMk cId="2349023615" sldId="258"/>
-            <ac:picMk id="1026" creationId="{6A271AD3-B423-46AD-AB62-91E7D67FFDBB}"/>
-          </ac:picMkLst>
-        </pc:picChg>
-      </pc:sldChg>
-      <pc:sldChg chg="addSp delSp modSp add">
-        <pc:chgData name="Mac Ward" userId="8a6b6e81487c01eb" providerId="LiveId" clId="{E57B7486-BE84-4F44-90FF-66CDF96DF404}" dt="2019-04-17T22:17:13.419" v="97" actId="20577"/>
-        <pc:sldMkLst>
-          <pc:docMk/>
-          <pc:sldMk cId="1848646156" sldId="259"/>
-        </pc:sldMkLst>
-        <pc:spChg chg="add del">
-          <ac:chgData name="Mac Ward" userId="8a6b6e81487c01eb" providerId="LiveId" clId="{E57B7486-BE84-4F44-90FF-66CDF96DF404}" dt="2019-04-17T22:13:52.136" v="56"/>
-          <ac:spMkLst>
-            <pc:docMk/>
-            <pc:sldMk cId="1848646156" sldId="259"/>
-            <ac:spMk id="2" creationId="{91C2D161-3019-4125-892D-F17067DEEA29}"/>
-          </ac:spMkLst>
-        </pc:spChg>
-        <pc:spChg chg="add mod">
-          <ac:chgData name="Mac Ward" userId="8a6b6e81487c01eb" providerId="LiveId" clId="{E57B7486-BE84-4F44-90FF-66CDF96DF404}" dt="2019-04-17T22:15:22.236" v="65" actId="1076"/>
-          <ac:spMkLst>
-            <pc:docMk/>
-            <pc:sldMk cId="1848646156" sldId="259"/>
-            <ac:spMk id="3" creationId="{50DB1B69-21E8-4356-908F-79AB205C7E12}"/>
-          </ac:spMkLst>
-        </pc:spChg>
-        <pc:spChg chg="add del mod">
-          <ac:chgData name="Mac Ward" userId="8a6b6e81487c01eb" providerId="LiveId" clId="{E57B7486-BE84-4F44-90FF-66CDF96DF404}" dt="2019-04-17T22:16:39.458" v="88"/>
-          <ac:spMkLst>
-            <pc:docMk/>
-            <pc:sldMk cId="1848646156" sldId="259"/>
-            <ac:spMk id="4" creationId="{9AF29C24-F5AB-45E2-A215-FC203735C4B1}"/>
-          </ac:spMkLst>
-        </pc:spChg>
-        <pc:spChg chg="add mod">
-          <ac:chgData name="Mac Ward" userId="8a6b6e81487c01eb" providerId="LiveId" clId="{E57B7486-BE84-4F44-90FF-66CDF96DF404}" dt="2019-04-17T22:17:13.419" v="97" actId="20577"/>
-          <ac:spMkLst>
-            <pc:docMk/>
-            <pc:sldMk cId="1848646156" sldId="259"/>
-            <ac:spMk id="5" creationId="{630B01E6-AB60-4B44-8BDC-07A97A749B86}"/>
-          </ac:spMkLst>
-        </pc:spChg>
-        <pc:picChg chg="add mod">
-          <ac:chgData name="Mac Ward" userId="8a6b6e81487c01eb" providerId="LiveId" clId="{E57B7486-BE84-4F44-90FF-66CDF96DF404}" dt="2019-04-17T22:16:14.262" v="74" actId="1076"/>
-          <ac:picMkLst>
-            <pc:docMk/>
-            <pc:sldMk cId="1848646156" sldId="259"/>
-            <ac:picMk id="2050" creationId="{3B0DEEC7-0A15-4BBE-87A3-266120AEF98D}"/>
-          </ac:picMkLst>
-        </pc:picChg>
-      </pc:sldChg>
-      <pc:sldChg chg="addSp delSp modSp add">
-        <pc:chgData name="Mac Ward" userId="8a6b6e81487c01eb" providerId="LiveId" clId="{E57B7486-BE84-4F44-90FF-66CDF96DF404}" dt="2019-04-17T22:20:07.388" v="114" actId="1076"/>
-        <pc:sldMkLst>
-          <pc:docMk/>
-          <pc:sldMk cId="1168739878" sldId="260"/>
-        </pc:sldMkLst>
-        <pc:spChg chg="add del mod">
-          <ac:chgData name="Mac Ward" userId="8a6b6e81487c01eb" providerId="LiveId" clId="{E57B7486-BE84-4F44-90FF-66CDF96DF404}" dt="2019-04-17T22:19:49.733" v="107"/>
-          <ac:spMkLst>
-            <pc:docMk/>
-            <pc:sldMk cId="1168739878" sldId="260"/>
-            <ac:spMk id="2" creationId="{AAB032DD-5F80-4049-B609-6067F2A27A5B}"/>
-          </ac:spMkLst>
-        </pc:spChg>
-        <pc:spChg chg="add mod">
-          <ac:chgData name="Mac Ward" userId="8a6b6e81487c01eb" providerId="LiveId" clId="{E57B7486-BE84-4F44-90FF-66CDF96DF404}" dt="2019-04-17T22:20:02.864" v="113" actId="1076"/>
-          <ac:spMkLst>
-            <pc:docMk/>
-            <pc:sldMk cId="1168739878" sldId="260"/>
-            <ac:spMk id="4" creationId="{74E840F6-30A2-4453-94B3-E025EC532CD5}"/>
-          </ac:spMkLst>
-        </pc:spChg>
-        <pc:picChg chg="add mod">
-          <ac:chgData name="Mac Ward" userId="8a6b6e81487c01eb" providerId="LiveId" clId="{E57B7486-BE84-4F44-90FF-66CDF96DF404}" dt="2019-04-17T22:20:07.388" v="114" actId="1076"/>
-          <ac:picMkLst>
-            <pc:docMk/>
-            <pc:sldMk cId="1168739878" sldId="260"/>
-            <ac:picMk id="3074" creationId="{B73DEFE7-F9D7-4750-9591-911354791069}"/>
-          </ac:picMkLst>
-        </pc:picChg>
-      </pc:sldChg>
-    </pc:docChg>
-  </pc:docChgLst>
   <pc:docChgLst>
     <pc:chgData name="Mac Ward" userId="8a6b6e81487c01eb" providerId="LiveId" clId="{5EF8C87D-C143-430C-AB74-C2FDCAE6B5FE}"/>
     <pc:docChg chg="undo custSel addSld delSld modSld">
@@ -517,6 +354,170 @@
       </pc:sldChg>
     </pc:docChg>
   </pc:docChgLst>
+  <pc:docChgLst>
+    <pc:chgData name="Mac Ward" userId="8a6b6e81487c01eb" providerId="LiveId" clId="{E57B7486-BE84-4F44-90FF-66CDF96DF404}"/>
+    <pc:docChg chg="addSld modSld">
+      <pc:chgData name="Mac Ward" userId="8a6b6e81487c01eb" providerId="LiveId" clId="{E57B7486-BE84-4F44-90FF-66CDF96DF404}" dt="2019-04-17T22:20:48.061" v="201" actId="20577"/>
+      <pc:docMkLst>
+        <pc:docMk/>
+      </pc:docMkLst>
+      <pc:sldChg chg="modSp">
+        <pc:chgData name="Mac Ward" userId="8a6b6e81487c01eb" providerId="LiveId" clId="{E57B7486-BE84-4F44-90FF-66CDF96DF404}" dt="2019-04-17T22:20:48.061" v="201" actId="20577"/>
+        <pc:sldMkLst>
+          <pc:docMk/>
+          <pc:sldMk cId="2578171886" sldId="256"/>
+        </pc:sldMkLst>
+        <pc:spChg chg="mod">
+          <ac:chgData name="Mac Ward" userId="8a6b6e81487c01eb" providerId="LiveId" clId="{E57B7486-BE84-4F44-90FF-66CDF96DF404}" dt="2019-04-17T22:07:09.784" v="22" actId="20577"/>
+          <ac:spMkLst>
+            <pc:docMk/>
+            <pc:sldMk cId="2578171886" sldId="256"/>
+            <ac:spMk id="2" creationId="{5CADFF1F-4ABE-4400-9EFA-F76ADA081DE5}"/>
+          </ac:spMkLst>
+        </pc:spChg>
+        <pc:spChg chg="mod">
+          <ac:chgData name="Mac Ward" userId="8a6b6e81487c01eb" providerId="LiveId" clId="{E57B7486-BE84-4F44-90FF-66CDF96DF404}" dt="2019-04-17T22:20:48.061" v="201" actId="20577"/>
+          <ac:spMkLst>
+            <pc:docMk/>
+            <pc:sldMk cId="2578171886" sldId="256"/>
+            <ac:spMk id="3" creationId="{096392BD-E6C3-4C07-8920-6E228B0E6CEC}"/>
+          </ac:spMkLst>
+        </pc:spChg>
+      </pc:sldChg>
+      <pc:sldChg chg="modSp">
+        <pc:chgData name="Mac Ward" userId="8a6b6e81487c01eb" providerId="LiveId" clId="{E57B7486-BE84-4F44-90FF-66CDF96DF404}" dt="2019-04-17T22:11:28.378" v="37" actId="404"/>
+        <pc:sldMkLst>
+          <pc:docMk/>
+          <pc:sldMk cId="3720381224" sldId="257"/>
+        </pc:sldMkLst>
+        <pc:spChg chg="mod">
+          <ac:chgData name="Mac Ward" userId="8a6b6e81487c01eb" providerId="LiveId" clId="{E57B7486-BE84-4F44-90FF-66CDF96DF404}" dt="2019-04-17T22:11:28.378" v="37" actId="404"/>
+          <ac:spMkLst>
+            <pc:docMk/>
+            <pc:sldMk cId="3720381224" sldId="257"/>
+            <ac:spMk id="3" creationId="{D5F7A71E-A240-41CB-A901-B6A673C61435}"/>
+          </ac:spMkLst>
+        </pc:spChg>
+        <pc:picChg chg="mod">
+          <ac:chgData name="Mac Ward" userId="8a6b6e81487c01eb" providerId="LiveId" clId="{E57B7486-BE84-4F44-90FF-66CDF96DF404}" dt="2019-04-17T22:08:18.989" v="25" actId="14100"/>
+          <ac:picMkLst>
+            <pc:docMk/>
+            <pc:sldMk cId="3720381224" sldId="257"/>
+            <ac:picMk id="2" creationId="{E3B7C121-9268-4C66-9922-A7D5D319B9BC}"/>
+          </ac:picMkLst>
+        </pc:picChg>
+      </pc:sldChg>
+      <pc:sldChg chg="addSp modSp add">
+        <pc:chgData name="Mac Ward" userId="8a6b6e81487c01eb" providerId="LiveId" clId="{E57B7486-BE84-4F44-90FF-66CDF96DF404}" dt="2019-04-17T22:16:55.980" v="92" actId="2711"/>
+        <pc:sldMkLst>
+          <pc:docMk/>
+          <pc:sldMk cId="2349023615" sldId="258"/>
+        </pc:sldMkLst>
+        <pc:spChg chg="add mod">
+          <ac:chgData name="Mac Ward" userId="8a6b6e81487c01eb" providerId="LiveId" clId="{E57B7486-BE84-4F44-90FF-66CDF96DF404}" dt="2019-04-17T22:11:18.716" v="33" actId="1076"/>
+          <ac:spMkLst>
+            <pc:docMk/>
+            <pc:sldMk cId="2349023615" sldId="258"/>
+            <ac:spMk id="2" creationId="{67608B0C-720E-4935-B472-CBEDD321DFAA}"/>
+          </ac:spMkLst>
+        </pc:spChg>
+        <pc:spChg chg="add mod">
+          <ac:chgData name="Mac Ward" userId="8a6b6e81487c01eb" providerId="LiveId" clId="{E57B7486-BE84-4F44-90FF-66CDF96DF404}" dt="2019-04-17T22:16:55.980" v="92" actId="2711"/>
+          <ac:spMkLst>
+            <pc:docMk/>
+            <pc:sldMk cId="2349023615" sldId="258"/>
+            <ac:spMk id="3" creationId="{CB3CCAAD-6E69-45C7-8D0E-169C8DEDEBC6}"/>
+          </ac:spMkLst>
+        </pc:spChg>
+        <pc:picChg chg="add">
+          <ac:chgData name="Mac Ward" userId="8a6b6e81487c01eb" providerId="LiveId" clId="{E57B7486-BE84-4F44-90FF-66CDF96DF404}" dt="2019-04-17T22:10:52.489" v="27"/>
+          <ac:picMkLst>
+            <pc:docMk/>
+            <pc:sldMk cId="2349023615" sldId="258"/>
+            <ac:picMk id="1026" creationId="{6A271AD3-B423-46AD-AB62-91E7D67FFDBB}"/>
+          </ac:picMkLst>
+        </pc:picChg>
+      </pc:sldChg>
+      <pc:sldChg chg="addSp delSp modSp add">
+        <pc:chgData name="Mac Ward" userId="8a6b6e81487c01eb" providerId="LiveId" clId="{E57B7486-BE84-4F44-90FF-66CDF96DF404}" dt="2019-04-17T22:17:13.419" v="97" actId="20577"/>
+        <pc:sldMkLst>
+          <pc:docMk/>
+          <pc:sldMk cId="1848646156" sldId="259"/>
+        </pc:sldMkLst>
+        <pc:spChg chg="add del">
+          <ac:chgData name="Mac Ward" userId="8a6b6e81487c01eb" providerId="LiveId" clId="{E57B7486-BE84-4F44-90FF-66CDF96DF404}" dt="2019-04-17T22:13:52.136" v="56"/>
+          <ac:spMkLst>
+            <pc:docMk/>
+            <pc:sldMk cId="1848646156" sldId="259"/>
+            <ac:spMk id="2" creationId="{91C2D161-3019-4125-892D-F17067DEEA29}"/>
+          </ac:spMkLst>
+        </pc:spChg>
+        <pc:spChg chg="add mod">
+          <ac:chgData name="Mac Ward" userId="8a6b6e81487c01eb" providerId="LiveId" clId="{E57B7486-BE84-4F44-90FF-66CDF96DF404}" dt="2019-04-17T22:15:22.236" v="65" actId="1076"/>
+          <ac:spMkLst>
+            <pc:docMk/>
+            <pc:sldMk cId="1848646156" sldId="259"/>
+            <ac:spMk id="3" creationId="{50DB1B69-21E8-4356-908F-79AB205C7E12}"/>
+          </ac:spMkLst>
+        </pc:spChg>
+        <pc:spChg chg="add del mod">
+          <ac:chgData name="Mac Ward" userId="8a6b6e81487c01eb" providerId="LiveId" clId="{E57B7486-BE84-4F44-90FF-66CDF96DF404}" dt="2019-04-17T22:16:39.458" v="88"/>
+          <ac:spMkLst>
+            <pc:docMk/>
+            <pc:sldMk cId="1848646156" sldId="259"/>
+            <ac:spMk id="4" creationId="{9AF29C24-F5AB-45E2-A215-FC203735C4B1}"/>
+          </ac:spMkLst>
+        </pc:spChg>
+        <pc:spChg chg="add mod">
+          <ac:chgData name="Mac Ward" userId="8a6b6e81487c01eb" providerId="LiveId" clId="{E57B7486-BE84-4F44-90FF-66CDF96DF404}" dt="2019-04-17T22:17:13.419" v="97" actId="20577"/>
+          <ac:spMkLst>
+            <pc:docMk/>
+            <pc:sldMk cId="1848646156" sldId="259"/>
+            <ac:spMk id="5" creationId="{630B01E6-AB60-4B44-8BDC-07A97A749B86}"/>
+          </ac:spMkLst>
+        </pc:spChg>
+        <pc:picChg chg="add mod">
+          <ac:chgData name="Mac Ward" userId="8a6b6e81487c01eb" providerId="LiveId" clId="{E57B7486-BE84-4F44-90FF-66CDF96DF404}" dt="2019-04-17T22:16:14.262" v="74" actId="1076"/>
+          <ac:picMkLst>
+            <pc:docMk/>
+            <pc:sldMk cId="1848646156" sldId="259"/>
+            <ac:picMk id="2050" creationId="{3B0DEEC7-0A15-4BBE-87A3-266120AEF98D}"/>
+          </ac:picMkLst>
+        </pc:picChg>
+      </pc:sldChg>
+      <pc:sldChg chg="addSp delSp modSp add">
+        <pc:chgData name="Mac Ward" userId="8a6b6e81487c01eb" providerId="LiveId" clId="{E57B7486-BE84-4F44-90FF-66CDF96DF404}" dt="2019-04-17T22:20:07.388" v="114" actId="1076"/>
+        <pc:sldMkLst>
+          <pc:docMk/>
+          <pc:sldMk cId="1168739878" sldId="260"/>
+        </pc:sldMkLst>
+        <pc:spChg chg="add del mod">
+          <ac:chgData name="Mac Ward" userId="8a6b6e81487c01eb" providerId="LiveId" clId="{E57B7486-BE84-4F44-90FF-66CDF96DF404}" dt="2019-04-17T22:19:49.733" v="107"/>
+          <ac:spMkLst>
+            <pc:docMk/>
+            <pc:sldMk cId="1168739878" sldId="260"/>
+            <ac:spMk id="2" creationId="{AAB032DD-5F80-4049-B609-6067F2A27A5B}"/>
+          </ac:spMkLst>
+        </pc:spChg>
+        <pc:spChg chg="add mod">
+          <ac:chgData name="Mac Ward" userId="8a6b6e81487c01eb" providerId="LiveId" clId="{E57B7486-BE84-4F44-90FF-66CDF96DF404}" dt="2019-04-17T22:20:02.864" v="113" actId="1076"/>
+          <ac:spMkLst>
+            <pc:docMk/>
+            <pc:sldMk cId="1168739878" sldId="260"/>
+            <ac:spMk id="4" creationId="{74E840F6-30A2-4453-94B3-E025EC532CD5}"/>
+          </ac:spMkLst>
+        </pc:spChg>
+        <pc:picChg chg="add mod">
+          <ac:chgData name="Mac Ward" userId="8a6b6e81487c01eb" providerId="LiveId" clId="{E57B7486-BE84-4F44-90FF-66CDF96DF404}" dt="2019-04-17T22:20:07.388" v="114" actId="1076"/>
+          <ac:picMkLst>
+            <pc:docMk/>
+            <pc:sldMk cId="1168739878" sldId="260"/>
+            <ac:picMk id="3074" creationId="{B73DEFE7-F9D7-4750-9591-911354791069}"/>
+          </ac:picMkLst>
+        </pc:picChg>
+      </pc:sldChg>
+    </pc:docChg>
+  </pc:docChgLst>
 </pc:chgInfo>
 </file>
 
@@ -602,7 +603,7 @@
           <a:p>
             <a:fld id="{D74D0315-B5E4-4552-92F1-2BE6433D67E1}" type="datetimeFigureOut">
               <a:rPr lang="en-US" smtClean="0"/>
-              <a:t>4/26/2019</a:t>
+              <a:t>5/3/2019</a:t>
             </a:fld>
             <a:endParaRPr lang="en-US"/>
           </a:p>
@@ -1090,7 +1091,7 @@
           <a:p>
             <a:fld id="{B4BBB9B7-F037-49B0-8943-DFE817CE2830}" type="datetimeFigureOut">
               <a:rPr lang="en-US" smtClean="0"/>
-              <a:t>4/26/2019</a:t>
+              <a:t>5/3/2019</a:t>
             </a:fld>
             <a:endParaRPr lang="en-US"/>
           </a:p>
@@ -1260,7 +1261,7 @@
           <a:p>
             <a:fld id="{B4BBB9B7-F037-49B0-8943-DFE817CE2830}" type="datetimeFigureOut">
               <a:rPr lang="en-US" smtClean="0"/>
-              <a:t>4/26/2019</a:t>
+              <a:t>5/3/2019</a:t>
             </a:fld>
             <a:endParaRPr lang="en-US"/>
           </a:p>
@@ -1440,7 +1441,7 @@
           <a:p>
             <a:fld id="{B4BBB9B7-F037-49B0-8943-DFE817CE2830}" type="datetimeFigureOut">
               <a:rPr lang="en-US" smtClean="0"/>
-              <a:t>4/26/2019</a:t>
+              <a:t>5/3/2019</a:t>
             </a:fld>
             <a:endParaRPr lang="en-US"/>
           </a:p>
@@ -1610,7 +1611,7 @@
           <a:p>
             <a:fld id="{B4BBB9B7-F037-49B0-8943-DFE817CE2830}" type="datetimeFigureOut">
               <a:rPr lang="en-US" smtClean="0"/>
-              <a:t>4/26/2019</a:t>
+              <a:t>5/3/2019</a:t>
             </a:fld>
             <a:endParaRPr lang="en-US"/>
           </a:p>
@@ -1856,7 +1857,7 @@
           <a:p>
             <a:fld id="{B4BBB9B7-F037-49B0-8943-DFE817CE2830}" type="datetimeFigureOut">
               <a:rPr lang="en-US" smtClean="0"/>
-              <a:t>4/26/2019</a:t>
+              <a:t>5/3/2019</a:t>
             </a:fld>
             <a:endParaRPr lang="en-US"/>
           </a:p>
@@ -2088,7 +2089,7 @@
           <a:p>
             <a:fld id="{B4BBB9B7-F037-49B0-8943-DFE817CE2830}" type="datetimeFigureOut">
               <a:rPr lang="en-US" smtClean="0"/>
-              <a:t>4/26/2019</a:t>
+              <a:t>5/3/2019</a:t>
             </a:fld>
             <a:endParaRPr lang="en-US"/>
           </a:p>
@@ -2455,7 +2456,7 @@
           <a:p>
             <a:fld id="{B4BBB9B7-F037-49B0-8943-DFE817CE2830}" type="datetimeFigureOut">
               <a:rPr lang="en-US" smtClean="0"/>
-              <a:t>4/26/2019</a:t>
+              <a:t>5/3/2019</a:t>
             </a:fld>
             <a:endParaRPr lang="en-US"/>
           </a:p>
@@ -2573,7 +2574,7 @@
           <a:p>
             <a:fld id="{B4BBB9B7-F037-49B0-8943-DFE817CE2830}" type="datetimeFigureOut">
               <a:rPr lang="en-US" smtClean="0"/>
-              <a:t>4/26/2019</a:t>
+              <a:t>5/3/2019</a:t>
             </a:fld>
             <a:endParaRPr lang="en-US"/>
           </a:p>
@@ -2668,7 +2669,7 @@
           <a:p>
             <a:fld id="{B4BBB9B7-F037-49B0-8943-DFE817CE2830}" type="datetimeFigureOut">
               <a:rPr lang="en-US" smtClean="0"/>
-              <a:t>4/26/2019</a:t>
+              <a:t>5/3/2019</a:t>
             </a:fld>
             <a:endParaRPr lang="en-US"/>
           </a:p>
@@ -2945,7 +2946,7 @@
           <a:p>
             <a:fld id="{B4BBB9B7-F037-49B0-8943-DFE817CE2830}" type="datetimeFigureOut">
               <a:rPr lang="en-US" smtClean="0"/>
-              <a:t>4/26/2019</a:t>
+              <a:t>5/3/2019</a:t>
             </a:fld>
             <a:endParaRPr lang="en-US"/>
           </a:p>
@@ -3202,7 +3203,7 @@
           <a:p>
             <a:fld id="{B4BBB9B7-F037-49B0-8943-DFE817CE2830}" type="datetimeFigureOut">
               <a:rPr lang="en-US" smtClean="0"/>
-              <a:t>4/26/2019</a:t>
+              <a:t>5/3/2019</a:t>
             </a:fld>
             <a:endParaRPr lang="en-US"/>
           </a:p>
@@ -3415,7 +3416,7 @@
           <a:p>
             <a:fld id="{B4BBB9B7-F037-49B0-8943-DFE817CE2830}" type="datetimeFigureOut">
               <a:rPr lang="en-US" smtClean="0"/>
-              <a:t>4/26/2019</a:t>
+              <a:t>5/3/2019</a:t>
             </a:fld>
             <a:endParaRPr lang="en-US"/>
           </a:p>
@@ -4040,6 +4041,154 @@
 </file>
 
 <file path=ppt/slides/slide11.xml><?xml version="1.0" encoding="utf-8"?>
+<p:sld xmlns:a="http://schemas.openxmlformats.org/drawingml/2006/main" xmlns:r="http://schemas.openxmlformats.org/officeDocument/2006/relationships" xmlns:p="http://schemas.openxmlformats.org/presentationml/2006/main">
+  <p:cSld>
+    <p:spTree>
+      <p:nvGrpSpPr>
+        <p:cNvPr id="1" name=""/>
+        <p:cNvGrpSpPr/>
+        <p:nvPr/>
+      </p:nvGrpSpPr>
+      <p:grpSpPr>
+        <a:xfrm>
+          <a:off x="0" y="0"/>
+          <a:ext cx="0" cy="0"/>
+          <a:chOff x="0" y="0"/>
+          <a:chExt cx="0" cy="0"/>
+        </a:xfrm>
+      </p:grpSpPr>
+      <p:pic>
+        <p:nvPicPr>
+          <p:cNvPr id="1026" name="Picture 2" descr="See the source image">
+            <a:extLst>
+              <a:ext uri="{FF2B5EF4-FFF2-40B4-BE49-F238E27FC236}">
+                <a16:creationId xmlns:a16="http://schemas.microsoft.com/office/drawing/2014/main" id="{83D55645-35E9-478F-891F-CE9AB2C496F8}"/>
+              </a:ext>
+            </a:extLst>
+          </p:cNvPr>
+          <p:cNvPicPr>
+            <a:picLocks noChangeAspect="1" noChangeArrowheads="1"/>
+          </p:cNvPicPr>
+          <p:nvPr/>
+        </p:nvPicPr>
+        <p:blipFill rotWithShape="1">
+          <a:blip r:embed="rId2">
+            <a:extLst>
+              <a:ext uri="{28A0092B-C50C-407E-A947-70E740481C1C}">
+                <a14:useLocalDpi xmlns:a14="http://schemas.microsoft.com/office/drawing/2010/main" val="0"/>
+              </a:ext>
+            </a:extLst>
+          </a:blip>
+          <a:srcRect b="11779"/>
+          <a:stretch/>
+        </p:blipFill>
+        <p:spPr bwMode="auto">
+          <a:xfrm>
+            <a:off x="1994498" y="361506"/>
+            <a:ext cx="11721501" cy="7537027"/>
+          </a:xfrm>
+          <a:prstGeom prst="rect">
+            <a:avLst/>
+          </a:prstGeom>
+          <a:noFill/>
+          <a:extLst>
+            <a:ext uri="{909E8E84-426E-40DD-AFC4-6F175D3DCCD1}">
+              <a14:hiddenFill xmlns:a14="http://schemas.microsoft.com/office/drawing/2010/main">
+                <a:solidFill>
+                  <a:srgbClr val="FFFFFF"/>
+                </a:solidFill>
+              </a14:hiddenFill>
+            </a:ext>
+          </a:extLst>
+        </p:spPr>
+      </p:pic>
+      <p:sp>
+        <p:nvSpPr>
+          <p:cNvPr id="2" name="Rectangle 1">
+            <a:extLst>
+              <a:ext uri="{FF2B5EF4-FFF2-40B4-BE49-F238E27FC236}">
+                <a16:creationId xmlns:a16="http://schemas.microsoft.com/office/drawing/2014/main" id="{C53262EE-3740-4550-BCC6-43AFFFD36898}"/>
+              </a:ext>
+            </a:extLst>
+          </p:cNvPr>
+          <p:cNvSpPr/>
+          <p:nvPr/>
+        </p:nvSpPr>
+        <p:spPr>
+          <a:xfrm>
+            <a:off x="0" y="7860268"/>
+            <a:ext cx="13716000" cy="369332"/>
+          </a:xfrm>
+          <a:prstGeom prst="rect">
+            <a:avLst/>
+          </a:prstGeom>
+        </p:spPr>
+        <p:txBody>
+          <a:bodyPr wrap="square">
+            <a:spAutoFit/>
+          </a:bodyPr>
+          <a:lstStyle/>
+          <a:p>
+            <a:pPr algn="r"/>
+            <a:r>
+              <a:rPr lang="en-US" dirty="0">
+                <a:hlinkClick r:id="rId3"/>
+              </a:rPr>
+              <a:t>http://agilecoachinginstitute.com</a:t>
+            </a:r>
+            <a:endParaRPr lang="en-US" dirty="0"/>
+          </a:p>
+        </p:txBody>
+      </p:sp>
+      <p:sp>
+        <p:nvSpPr>
+          <p:cNvPr id="4" name="Rectangle 3">
+            <a:extLst>
+              <a:ext uri="{FF2B5EF4-FFF2-40B4-BE49-F238E27FC236}">
+                <a16:creationId xmlns:a16="http://schemas.microsoft.com/office/drawing/2014/main" id="{BE054E67-24AD-4B25-89D0-06C3FF6B8926}"/>
+              </a:ext>
+            </a:extLst>
+          </p:cNvPr>
+          <p:cNvSpPr/>
+          <p:nvPr/>
+        </p:nvSpPr>
+        <p:spPr>
+          <a:xfrm rot="16200000">
+            <a:off x="-3386939" y="3386939"/>
+            <a:ext cx="8220428" cy="1446550"/>
+          </a:xfrm>
+          <a:prstGeom prst="rect">
+            <a:avLst/>
+          </a:prstGeom>
+        </p:spPr>
+        <p:txBody>
+          <a:bodyPr wrap="square">
+            <a:spAutoFit/>
+          </a:bodyPr>
+          <a:lstStyle/>
+          <a:p>
+            <a:pPr algn="ctr"/>
+            <a:r>
+              <a:rPr lang="en-US" sz="4400" b="1" dirty="0"/>
+              <a:t>Agile Coaching Competency Framework</a:t>
+            </a:r>
+          </a:p>
+        </p:txBody>
+      </p:sp>
+    </p:spTree>
+    <p:extLst>
+      <p:ext uri="{BB962C8B-B14F-4D97-AF65-F5344CB8AC3E}">
+        <p14:creationId xmlns:p14="http://schemas.microsoft.com/office/powerpoint/2010/main" val="2339607519"/>
+      </p:ext>
+    </p:extLst>
+  </p:cSld>
+  <p:clrMapOvr>
+    <a:masterClrMapping/>
+  </p:clrMapOvr>
+</p:sld>
+</file>
+
+<file path=ppt/slides/slide12.xml><?xml version="1.0" encoding="utf-8"?>
 <p:sld xmlns:a="http://schemas.openxmlformats.org/drawingml/2006/main" xmlns:r="http://schemas.openxmlformats.org/officeDocument/2006/relationships" xmlns:p="http://schemas.openxmlformats.org/presentationml/2006/main">
   <p:cSld>
     <p:spTree>

</xml_diff>